<commit_message>
Convert m/s to km/hr!!!!!!
</commit_message>
<xml_diff>
--- a/Presentations/CDR_Prop.pptx
+++ b/Presentations/CDR_Prop.pptx
@@ -11,6 +11,7 @@
     <p:sldId id="258" r:id="rId5"/>
     <p:sldId id="260" r:id="rId6"/>
     <p:sldId id="262" r:id="rId7"/>
+    <p:sldId id="263" r:id="rId8"/>
   </p:sldIdLst>
   <p:sldSz cx="12192000" cy="6858000"/>
   <p:notesSz cx="6858000" cy="9144000"/>
@@ -109,6 +110,11 @@
       </a:defRPr>
     </a:lvl9pPr>
   </p:defaultTextStyle>
+  <p:extLst>
+    <p:ext uri="{EFAFB233-063F-42B5-8137-9DF3F51BA10A}">
+      <p15:sldGuideLst xmlns:p15="http://schemas.microsoft.com/office/powerpoint/2012/main"/>
+    </p:ext>
+  </p:extLst>
 </p:presentation>
 </file>
 
@@ -243,7 +249,7 @@
           <a:p>
             <a:fld id="{AACD0CED-D901-47D3-A8C5-214804B68CB7}" type="datetimeFigureOut">
               <a:rPr lang="en-US" smtClean="0"/>
-              <a:t>10/18/2019</a:t>
+              <a:t>10/19/2019</a:t>
             </a:fld>
             <a:endParaRPr lang="en-US"/>
           </a:p>
@@ -413,7 +419,7 @@
           <a:p>
             <a:fld id="{AACD0CED-D901-47D3-A8C5-214804B68CB7}" type="datetimeFigureOut">
               <a:rPr lang="en-US" smtClean="0"/>
-              <a:t>10/18/2019</a:t>
+              <a:t>10/19/2019</a:t>
             </a:fld>
             <a:endParaRPr lang="en-US"/>
           </a:p>
@@ -593,7 +599,7 @@
           <a:p>
             <a:fld id="{AACD0CED-D901-47D3-A8C5-214804B68CB7}" type="datetimeFigureOut">
               <a:rPr lang="en-US" smtClean="0"/>
-              <a:t>10/18/2019</a:t>
+              <a:t>10/19/2019</a:t>
             </a:fld>
             <a:endParaRPr lang="en-US"/>
           </a:p>
@@ -763,7 +769,7 @@
           <a:p>
             <a:fld id="{AACD0CED-D901-47D3-A8C5-214804B68CB7}" type="datetimeFigureOut">
               <a:rPr lang="en-US" smtClean="0"/>
-              <a:t>10/18/2019</a:t>
+              <a:t>10/19/2019</a:t>
             </a:fld>
             <a:endParaRPr lang="en-US"/>
           </a:p>
@@ -1009,7 +1015,7 @@
           <a:p>
             <a:fld id="{AACD0CED-D901-47D3-A8C5-214804B68CB7}" type="datetimeFigureOut">
               <a:rPr lang="en-US" smtClean="0"/>
-              <a:t>10/18/2019</a:t>
+              <a:t>10/19/2019</a:t>
             </a:fld>
             <a:endParaRPr lang="en-US"/>
           </a:p>
@@ -1241,7 +1247,7 @@
           <a:p>
             <a:fld id="{AACD0CED-D901-47D3-A8C5-214804B68CB7}" type="datetimeFigureOut">
               <a:rPr lang="en-US" smtClean="0"/>
-              <a:t>10/18/2019</a:t>
+              <a:t>10/19/2019</a:t>
             </a:fld>
             <a:endParaRPr lang="en-US"/>
           </a:p>
@@ -1608,7 +1614,7 @@
           <a:p>
             <a:fld id="{AACD0CED-D901-47D3-A8C5-214804B68CB7}" type="datetimeFigureOut">
               <a:rPr lang="en-US" smtClean="0"/>
-              <a:t>10/18/2019</a:t>
+              <a:t>10/19/2019</a:t>
             </a:fld>
             <a:endParaRPr lang="en-US"/>
           </a:p>
@@ -1726,7 +1732,7 @@
           <a:p>
             <a:fld id="{AACD0CED-D901-47D3-A8C5-214804B68CB7}" type="datetimeFigureOut">
               <a:rPr lang="en-US" smtClean="0"/>
-              <a:t>10/18/2019</a:t>
+              <a:t>10/19/2019</a:t>
             </a:fld>
             <a:endParaRPr lang="en-US"/>
           </a:p>
@@ -1821,7 +1827,7 @@
           <a:p>
             <a:fld id="{AACD0CED-D901-47D3-A8C5-214804B68CB7}" type="datetimeFigureOut">
               <a:rPr lang="en-US" smtClean="0"/>
-              <a:t>10/18/2019</a:t>
+              <a:t>10/19/2019</a:t>
             </a:fld>
             <a:endParaRPr lang="en-US"/>
           </a:p>
@@ -2098,7 +2104,7 @@
           <a:p>
             <a:fld id="{AACD0CED-D901-47D3-A8C5-214804B68CB7}" type="datetimeFigureOut">
               <a:rPr lang="en-US" smtClean="0"/>
-              <a:t>10/18/2019</a:t>
+              <a:t>10/19/2019</a:t>
             </a:fld>
             <a:endParaRPr lang="en-US"/>
           </a:p>
@@ -2355,7 +2361,7 @@
           <a:p>
             <a:fld id="{AACD0CED-D901-47D3-A8C5-214804B68CB7}" type="datetimeFigureOut">
               <a:rPr lang="en-US" smtClean="0"/>
-              <a:t>10/18/2019</a:t>
+              <a:t>10/19/2019</a:t>
             </a:fld>
             <a:endParaRPr lang="en-US"/>
           </a:p>
@@ -2568,7 +2574,7 @@
           <a:p>
             <a:fld id="{AACD0CED-D901-47D3-A8C5-214804B68CB7}" type="datetimeFigureOut">
               <a:rPr lang="en-US" smtClean="0"/>
-              <a:t>10/18/2019</a:t>
+              <a:t>10/19/2019</a:t>
             </a:fld>
             <a:endParaRPr lang="en-US"/>
           </a:p>
@@ -5149,7 +5155,7 @@
           </p:nvPr>
         </p:nvPicPr>
         <p:blipFill rotWithShape="1">
-          <a:blip r:embed="rId3">
+          <a:blip r:embed="rId2">
             <a:extLst>
               <a:ext uri="{28A0092B-C50C-407E-A947-70E740481C1C}">
                 <a14:useLocalDpi xmlns:a14="http://schemas.microsoft.com/office/drawing/2010/main" val="0"/>
@@ -5181,7 +5187,7 @@
           <p:nvPr/>
         </p:nvPicPr>
         <p:blipFill>
-          <a:blip r:embed="rId4">
+          <a:blip r:embed="rId3">
             <a:extLst>
               <a:ext uri="{28A0092B-C50C-407E-A947-70E740481C1C}">
                 <a14:useLocalDpi xmlns:a14="http://schemas.microsoft.com/office/drawing/2010/main" val="0"/>
@@ -5322,7 +5328,7 @@
           <p:nvPr/>
         </p:nvPicPr>
         <p:blipFill rotWithShape="1">
-          <a:blip r:embed="rId3">
+          <a:blip r:embed="rId2">
             <a:extLst>
               <a:ext uri="{28A0092B-C50C-407E-A947-70E740481C1C}">
                 <a14:useLocalDpi xmlns:a14="http://schemas.microsoft.com/office/drawing/2010/main" val="0"/>
@@ -5775,6 +5781,105 @@
     <p:extLst>
       <p:ext uri="{BB962C8B-B14F-4D97-AF65-F5344CB8AC3E}">
         <p14:creationId xmlns:p14="http://schemas.microsoft.com/office/powerpoint/2010/main" val="2854481429"/>
+      </p:ext>
+    </p:extLst>
+  </p:cSld>
+  <p:clrMapOvr>
+    <a:masterClrMapping/>
+  </p:clrMapOvr>
+</p:sld>
+</file>
+
+<file path=ppt/slides/slide7.xml><?xml version="1.0" encoding="utf-8"?>
+<p:sld xmlns:a="http://schemas.openxmlformats.org/drawingml/2006/main" xmlns:r="http://schemas.openxmlformats.org/officeDocument/2006/relationships" xmlns:p="http://schemas.openxmlformats.org/presentationml/2006/main">
+  <p:cSld>
+    <p:spTree>
+      <p:nvGrpSpPr>
+        <p:cNvPr id="1" name=""/>
+        <p:cNvGrpSpPr/>
+        <p:nvPr/>
+      </p:nvGrpSpPr>
+      <p:grpSpPr>
+        <a:xfrm>
+          <a:off x="0" y="0"/>
+          <a:ext cx="0" cy="0"/>
+          <a:chOff x="0" y="0"/>
+          <a:chExt cx="0" cy="0"/>
+        </a:xfrm>
+      </p:grpSpPr>
+      <p:sp>
+        <p:nvSpPr>
+          <p:cNvPr id="2" name="Title 1">
+            <a:extLst>
+              <a:ext uri="{FF2B5EF4-FFF2-40B4-BE49-F238E27FC236}">
+                <a16:creationId xmlns:a16="http://schemas.microsoft.com/office/drawing/2014/main" id="{AE556A9A-3596-4736-AF68-D933C3F9F581}"/>
+              </a:ext>
+            </a:extLst>
+          </p:cNvPr>
+          <p:cNvSpPr>
+            <a:spLocks noGrp="1"/>
+          </p:cNvSpPr>
+          <p:nvPr>
+            <p:ph type="title"/>
+          </p:nvPr>
+        </p:nvSpPr>
+        <p:spPr/>
+        <p:txBody>
+          <a:bodyPr/>
+          <a:lstStyle/>
+          <a:p>
+            <a:r>
+              <a:rPr lang="en-US" dirty="0">
+                <a:latin typeface="BankGothic" panose="02000500000000000000" pitchFamily="2" charset="0"/>
+              </a:rPr>
+              <a:t>Valve Requirements</a:t>
+            </a:r>
+          </a:p>
+        </p:txBody>
+      </p:sp>
+      <p:sp>
+        <p:nvSpPr>
+          <p:cNvPr id="3" name="Content Placeholder 2">
+            <a:extLst>
+              <a:ext uri="{FF2B5EF4-FFF2-40B4-BE49-F238E27FC236}">
+                <a16:creationId xmlns:a16="http://schemas.microsoft.com/office/drawing/2014/main" id="{860EFB28-A7C1-4A63-9045-545F15802035}"/>
+              </a:ext>
+            </a:extLst>
+          </p:cNvPr>
+          <p:cNvSpPr>
+            <a:spLocks noGrp="1"/>
+          </p:cNvSpPr>
+          <p:nvPr>
+            <p:ph idx="1"/>
+          </p:nvPr>
+        </p:nvSpPr>
+        <p:spPr/>
+        <p:txBody>
+          <a:bodyPr/>
+          <a:lstStyle/>
+          <a:p>
+            <a:r>
+              <a:rPr lang="en-US" dirty="0">
+                <a:latin typeface="BankGothic" panose="02000500000000000000" pitchFamily="2" charset="0"/>
+              </a:rPr>
+              <a:t>Inlet Pressure ~4800psi</a:t>
+            </a:r>
+          </a:p>
+          <a:p>
+            <a:pPr lvl="1"/>
+            <a:r>
+              <a:rPr lang="en-US" dirty="0">
+                <a:latin typeface="BankGothic" panose="02000500000000000000" pitchFamily="2" charset="0"/>
+              </a:rPr>
+              <a:t>~ASME Class 2500</a:t>
+            </a:r>
+          </a:p>
+        </p:txBody>
+      </p:sp>
+    </p:spTree>
+    <p:extLst>
+      <p:ext uri="{BB962C8B-B14F-4D97-AF65-F5344CB8AC3E}">
+        <p14:creationId xmlns:p14="http://schemas.microsoft.com/office/powerpoint/2010/main" val="3768957478"/>
       </p:ext>
     </p:extLst>
   </p:cSld>

</xml_diff>